<commit_message>
add links to buttons
</commit_message>
<xml_diff>
--- a/Představujeme aplikaci.pptx
+++ b/Představujeme aplikaci.pptx
@@ -5,17 +5,18 @@
     <p:sldMasterId id="2147483816" r:id="rId1"/>
   </p:sldMasterIdLst>
   <p:notesMasterIdLst>
-    <p:notesMasterId r:id="rId10"/>
+    <p:notesMasterId r:id="rId11"/>
   </p:notesMasterIdLst>
   <p:sldIdLst>
     <p:sldId id="256" r:id="rId2"/>
     <p:sldId id="257" r:id="rId3"/>
     <p:sldId id="258" r:id="rId4"/>
-    <p:sldId id="259" r:id="rId5"/>
-    <p:sldId id="260" r:id="rId6"/>
-    <p:sldId id="261" r:id="rId7"/>
-    <p:sldId id="262" r:id="rId8"/>
-    <p:sldId id="263" r:id="rId9"/>
+    <p:sldId id="264" r:id="rId5"/>
+    <p:sldId id="259" r:id="rId6"/>
+    <p:sldId id="260" r:id="rId7"/>
+    <p:sldId id="261" r:id="rId8"/>
+    <p:sldId id="262" r:id="rId9"/>
+    <p:sldId id="263" r:id="rId10"/>
   </p:sldIdLst>
   <p:sldSz cx="12192000" cy="6858000"/>
   <p:notesSz cx="6858000" cy="9144000"/>
@@ -114,6 +115,11 @@
       </a:defRPr>
     </a:lvl9pPr>
   </p:defaultTextStyle>
+  <p:extLst>
+    <p:ext uri="{EFAFB233-063F-42B5-8137-9DF3F51BA10A}">
+      <p15:sldGuideLst xmlns:p15="http://schemas.microsoft.com/office/powerpoint/2012/main"/>
+    </p:ext>
+  </p:extLst>
 </p:presentation>
 </file>
 
@@ -548,7 +554,7 @@
           <a:p>
             <a:fld id="{0F29B71B-498E-4474-B7FB-D4FCE6DE574C}" type="slidenum">
               <a:rPr lang="cs-CZ" smtClean="0"/>
-              <a:t>4</a:t>
+              <a:t>5</a:t>
             </a:fld>
             <a:endParaRPr lang="cs-CZ"/>
           </a:p>
@@ -3632,26 +3638,25 @@
           <a:p>
             <a:r>
               <a:rPr lang="cs-CZ" dirty="0"/>
-              <a:t>Je potřeba provádět pravidelné inventury</a:t>
+              <a:t>Jednou za čas je potřeba provést řádnou inventuru položek na Vašem skladě</a:t>
             </a:r>
           </a:p>
           <a:p>
             <a:r>
               <a:rPr lang="cs-CZ" dirty="0"/>
-              <a:t>Každá firma chce mít pořádek na skladě</a:t>
-            </a:r>
-          </a:p>
-          <a:p>
-            <a:pPr lvl="1"/>
+              <a:t>Mít přehled o reálném počtu položek na skladě je klíčové pro každou společnost</a:t>
+            </a:r>
+          </a:p>
+          <a:p>
             <a:r>
               <a:rPr lang="cs-CZ" dirty="0"/>
-              <a:t>Klíčové: přehled o podnikání -&gt; efektivita</a:t>
+              <a:t>Pravidelné a rutinní inventury zabírají drahocenný čas Vám i zaměstnancům Vaší firmy, který můžete věnovat důležitější práci</a:t>
             </a:r>
           </a:p>
           <a:p>
             <a:r>
               <a:rPr lang="cs-CZ" dirty="0"/>
-              <a:t>Inventury jsou časově náročné a zabírají čas zaměstnancům, kteří se nemohou věnovat např. kreativnější práci</a:t>
+              <a:t>Máme pro Vás řešení</a:t>
             </a:r>
           </a:p>
         </p:txBody>
@@ -3737,31 +3742,61 @@
           <a:p>
             <a:r>
               <a:rPr lang="cs-CZ" dirty="0"/>
-              <a:t>Naše aplikace urychluje proces inventury</a:t>
-            </a:r>
-          </a:p>
-          <a:p>
+              <a:t>Naše aplikace urychluje proces inventury a šetří čas a peníze Vaší firmě</a:t>
+            </a:r>
+          </a:p>
+          <a:p>
+            <a:r>
+              <a:rPr lang="cs-CZ" dirty="0"/>
+              <a:t>Klíčové vlastnosti aplikace</a:t>
+            </a:r>
+          </a:p>
+          <a:p>
+            <a:pPr lvl="1"/>
             <a:r>
               <a:rPr lang="cs-CZ" dirty="0"/>
               <a:t>Jednoduchost</a:t>
             </a:r>
           </a:p>
           <a:p>
+            <a:pPr lvl="1"/>
             <a:r>
               <a:rPr lang="cs-CZ" dirty="0"/>
               <a:t>Přehlednost</a:t>
             </a:r>
           </a:p>
           <a:p>
+            <a:pPr lvl="1"/>
             <a:r>
               <a:rPr lang="cs-CZ" dirty="0"/>
-              <a:t>Efektivita</a:t>
-            </a:r>
-          </a:p>
-          <a:p>
+              <a:t>Rychlost</a:t>
+            </a:r>
+          </a:p>
+          <a:p>
+            <a:pPr lvl="1"/>
             <a:r>
               <a:rPr lang="cs-CZ" dirty="0"/>
               <a:t>Spolehlivost</a:t>
+            </a:r>
+          </a:p>
+          <a:p>
+            <a:r>
+              <a:rPr lang="cs-CZ" dirty="0"/>
+              <a:t>Aplikace představuje jednoduše </a:t>
+            </a:r>
+            <a:r>
+              <a:rPr lang="cs-CZ" dirty="0" err="1"/>
+              <a:t>integrovatelný</a:t>
+            </a:r>
+            <a:r>
+              <a:rPr lang="cs-CZ" dirty="0"/>
+              <a:t> nástroj do Vašich stávajících systémů</a:t>
+            </a:r>
+          </a:p>
+          <a:p>
+            <a:r>
+              <a:rPr lang="cs-CZ" dirty="0"/>
+              <a:t>Nástroj je vhodný pro velké hráče i lokální podniky</a:t>
             </a:r>
           </a:p>
         </p:txBody>
@@ -3780,6 +3815,151 @@
 </file>
 
 <file path=ppt/slides/slide4.xml><?xml version="1.0" encoding="utf-8"?>
+<p:sld xmlns:a="http://schemas.openxmlformats.org/drawingml/2006/main" xmlns:r="http://schemas.openxmlformats.org/officeDocument/2006/relationships" xmlns:p="http://schemas.openxmlformats.org/presentationml/2006/main">
+  <p:cSld>
+    <p:spTree>
+      <p:nvGrpSpPr>
+        <p:cNvPr id="1" name=""/>
+        <p:cNvGrpSpPr/>
+        <p:nvPr/>
+      </p:nvGrpSpPr>
+      <p:grpSpPr>
+        <a:xfrm>
+          <a:off x="0" y="0"/>
+          <a:ext cx="0" cy="0"/>
+          <a:chOff x="0" y="0"/>
+          <a:chExt cx="0" cy="0"/>
+        </a:xfrm>
+      </p:grpSpPr>
+      <p:sp>
+        <p:nvSpPr>
+          <p:cNvPr id="2" name="Nadpis 1">
+            <a:extLst>
+              <a:ext uri="{FF2B5EF4-FFF2-40B4-BE49-F238E27FC236}">
+                <a16:creationId xmlns:a16="http://schemas.microsoft.com/office/drawing/2014/main" id="{A7E779BB-FE7C-46AE-B642-337848236C66}"/>
+              </a:ext>
+            </a:extLst>
+          </p:cNvPr>
+          <p:cNvSpPr>
+            <a:spLocks noGrp="1"/>
+          </p:cNvSpPr>
+          <p:nvPr>
+            <p:ph type="title"/>
+          </p:nvPr>
+        </p:nvSpPr>
+        <p:spPr/>
+        <p:txBody>
+          <a:bodyPr/>
+          <a:lstStyle/>
+          <a:p>
+            <a:r>
+              <a:rPr lang="cs-CZ" dirty="0"/>
+              <a:t>Co Vám naše aplikace přinese?</a:t>
+            </a:r>
+          </a:p>
+        </p:txBody>
+      </p:sp>
+      <p:sp>
+        <p:nvSpPr>
+          <p:cNvPr id="3" name="Zástupný obsah 2">
+            <a:extLst>
+              <a:ext uri="{FF2B5EF4-FFF2-40B4-BE49-F238E27FC236}">
+                <a16:creationId xmlns:a16="http://schemas.microsoft.com/office/drawing/2014/main" id="{82C42F61-AF88-4E57-AD7E-85DA883CC197}"/>
+              </a:ext>
+            </a:extLst>
+          </p:cNvPr>
+          <p:cNvSpPr>
+            <a:spLocks noGrp="1"/>
+          </p:cNvSpPr>
+          <p:nvPr>
+            <p:ph idx="1"/>
+          </p:nvPr>
+        </p:nvSpPr>
+        <p:spPr/>
+        <p:txBody>
+          <a:bodyPr/>
+          <a:lstStyle/>
+          <a:p>
+            <a:r>
+              <a:rPr lang="cs-CZ" dirty="0"/>
+              <a:t>Budete mít všechny Vaše sklady a příslušné inventury přehledně na jednom místě</a:t>
+            </a:r>
+          </a:p>
+          <a:p>
+            <a:r>
+              <a:rPr lang="cs-CZ" dirty="0"/>
+              <a:t>Uvolníte kapacitu Vašich zaměstnanců</a:t>
+            </a:r>
+          </a:p>
+          <a:p>
+            <a:r>
+              <a:rPr lang="cs-CZ" dirty="0"/>
+              <a:t>Vaše firma bude efektivnější a produktivnější</a:t>
+            </a:r>
+          </a:p>
+        </p:txBody>
+      </p:sp>
+      <p:pic>
+        <p:nvPicPr>
+          <p:cNvPr id="1026" name="Picture 2" descr="JAK MÍT STONKS/HOW TO GET STONKS[ANIMACE/ANIMATION]|HALF13STUDIO - YouTube">
+            <a:extLst>
+              <a:ext uri="{FF2B5EF4-FFF2-40B4-BE49-F238E27FC236}">
+                <a16:creationId xmlns:a16="http://schemas.microsoft.com/office/drawing/2014/main" id="{ACB991AF-EA11-4B30-90E3-34B779D7448D}"/>
+              </a:ext>
+            </a:extLst>
+          </p:cNvPr>
+          <p:cNvPicPr>
+            <a:picLocks noChangeAspect="1" noChangeArrowheads="1"/>
+          </p:cNvPicPr>
+          <p:nvPr/>
+        </p:nvPicPr>
+        <p:blipFill>
+          <a:blip r:embed="rId2">
+            <a:extLst>
+              <a:ext uri="{28A0092B-C50C-407E-A947-70E740481C1C}">
+                <a14:useLocalDpi xmlns:a14="http://schemas.microsoft.com/office/drawing/2010/main" val="0"/>
+              </a:ext>
+            </a:extLst>
+          </a:blip>
+          <a:srcRect/>
+          <a:stretch>
+            <a:fillRect/>
+          </a:stretch>
+        </p:blipFill>
+        <p:spPr bwMode="auto">
+          <a:xfrm>
+            <a:off x="3716784" y="3912517"/>
+            <a:ext cx="4758431" cy="2676617"/>
+          </a:xfrm>
+          <a:prstGeom prst="rect">
+            <a:avLst/>
+          </a:prstGeom>
+          <a:noFill/>
+          <a:extLst>
+            <a:ext uri="{909E8E84-426E-40DD-AFC4-6F175D3DCCD1}">
+              <a14:hiddenFill xmlns:a14="http://schemas.microsoft.com/office/drawing/2010/main">
+                <a:solidFill>
+                  <a:srgbClr val="FFFFFF"/>
+                </a:solidFill>
+              </a14:hiddenFill>
+            </a:ext>
+          </a:extLst>
+        </p:spPr>
+      </p:pic>
+    </p:spTree>
+    <p:extLst>
+      <p:ext uri="{BB962C8B-B14F-4D97-AF65-F5344CB8AC3E}">
+        <p14:creationId xmlns:p14="http://schemas.microsoft.com/office/powerpoint/2010/main" val="4227473667"/>
+      </p:ext>
+    </p:extLst>
+  </p:cSld>
+  <p:clrMapOvr>
+    <a:masterClrMapping/>
+  </p:clrMapOvr>
+</p:sld>
+</file>
+
+<file path=ppt/slides/slide5.xml><?xml version="1.0" encoding="utf-8"?>
 <p:sld xmlns:a="http://schemas.openxmlformats.org/drawingml/2006/main" xmlns:r="http://schemas.openxmlformats.org/officeDocument/2006/relationships" xmlns:p="http://schemas.openxmlformats.org/presentationml/2006/main">
   <p:cSld>
     <p:spTree>
@@ -3927,7 +4107,7 @@
 </p:sld>
 </file>
 
-<file path=ppt/slides/slide5.xml><?xml version="1.0" encoding="utf-8"?>
+<file path=ppt/slides/slide6.xml><?xml version="1.0" encoding="utf-8"?>
 <p:sld xmlns:a="http://schemas.openxmlformats.org/drawingml/2006/main" xmlns:r="http://schemas.openxmlformats.org/officeDocument/2006/relationships" xmlns:p="http://schemas.openxmlformats.org/presentationml/2006/main">
   <p:cSld>
     <p:spTree>
@@ -4227,7 +4407,7 @@
 </p:sld>
 </file>
 
-<file path=ppt/slides/slide6.xml><?xml version="1.0" encoding="utf-8"?>
+<file path=ppt/slides/slide7.xml><?xml version="1.0" encoding="utf-8"?>
 <p:sld xmlns:a="http://schemas.openxmlformats.org/drawingml/2006/main" xmlns:r="http://schemas.openxmlformats.org/officeDocument/2006/relationships" xmlns:p="http://schemas.openxmlformats.org/presentationml/2006/main">
   <p:cSld>
     <p:spTree>
@@ -4301,18 +4481,32 @@
           <a:p>
             <a:r>
               <a:rPr lang="cs-CZ" dirty="0"/>
-              <a:t>Stále přidáváme nové funkce atd </a:t>
-            </a:r>
+              <a:t>Plánovaná rozšíření</a:t>
+            </a:r>
+          </a:p>
+          <a:p>
+            <a:pPr lvl="1"/>
             <a:r>
               <a:rPr lang="cs-CZ" dirty="0" err="1"/>
-              <a:t>atd</a:t>
-            </a:r>
-            <a:endParaRPr lang="cs-CZ" dirty="0"/>
-          </a:p>
-          <a:p>
+              <a:t>Scanování</a:t>
+            </a:r>
             <a:r>
               <a:rPr lang="cs-CZ" dirty="0"/>
-              <a:t>Podpora</a:t>
+              <a:t> EAN kódů přes kameru</a:t>
+            </a:r>
+          </a:p>
+          <a:p>
+            <a:pPr lvl="1"/>
+            <a:r>
+              <a:rPr lang="cs-CZ" dirty="0"/>
+              <a:t>Pokročilejší úpravy již provedených inventur</a:t>
+            </a:r>
+          </a:p>
+          <a:p>
+            <a:pPr lvl="1"/>
+            <a:r>
+              <a:rPr lang="cs-CZ" dirty="0"/>
+              <a:t>Možnost smazat již nascanovanou položku</a:t>
             </a:r>
           </a:p>
         </p:txBody>
@@ -4330,7 +4524,7 @@
 </p:sld>
 </file>
 
-<file path=ppt/slides/slide7.xml><?xml version="1.0" encoding="utf-8"?>
+<file path=ppt/slides/slide8.xml><?xml version="1.0" encoding="utf-8"?>
 <p:sld xmlns:a="http://schemas.openxmlformats.org/drawingml/2006/main" xmlns:r="http://schemas.openxmlformats.org/officeDocument/2006/relationships" xmlns:p="http://schemas.openxmlformats.org/presentationml/2006/main">
   <p:cSld>
     <p:spTree>
@@ -4790,7 +4984,7 @@
 </p:sld>
 </file>
 
-<file path=ppt/slides/slide8.xml><?xml version="1.0" encoding="utf-8"?>
+<file path=ppt/slides/slide9.xml><?xml version="1.0" encoding="utf-8"?>
 <p:sld xmlns:a="http://schemas.openxmlformats.org/drawingml/2006/main" xmlns:r="http://schemas.openxmlformats.org/officeDocument/2006/relationships" xmlns:p="http://schemas.openxmlformats.org/presentationml/2006/main">
   <p:cSld>
     <p:spTree>

</xml_diff>